<commit_message>
WHEN WE KILL PORT 81,  WE CANT USE IT
</commit_message>
<xml_diff>
--- a/Evaluation-task/Evaluation task.pptx
+++ b/Evaluation-task/Evaluation task.pptx
@@ -211,7 +211,7 @@
           <a:p>
             <a:fld id="{6F7F4D78-66C8-437E-A8DB-120794D80903}" type="datetimeFigureOut">
               <a:rPr lang="en-SI" smtClean="0"/>
-              <a:t>10/04/2025</a:t>
+              <a:t>23/04/2025</a:t>
             </a:fld>
             <a:endParaRPr lang="en-SI"/>
           </a:p>
@@ -749,7 +749,7 @@
           <a:p>
             <a:fld id="{3C671D42-39AB-412B-B1CC-613232E62CBC}" type="datetimeFigureOut">
               <a:rPr lang="en-SI" smtClean="0"/>
-              <a:t>10/04/2025</a:t>
+              <a:t>23/04/2025</a:t>
             </a:fld>
             <a:endParaRPr lang="en-SI"/>
           </a:p>
@@ -1024,7 +1024,7 @@
           <a:p>
             <a:fld id="{3C671D42-39AB-412B-B1CC-613232E62CBC}" type="datetimeFigureOut">
               <a:rPr lang="en-SI" smtClean="0"/>
-              <a:t>10/04/2025</a:t>
+              <a:t>23/04/2025</a:t>
             </a:fld>
             <a:endParaRPr lang="en-SI"/>
           </a:p>
@@ -1218,7 +1218,7 @@
           <a:p>
             <a:fld id="{3C671D42-39AB-412B-B1CC-613232E62CBC}" type="datetimeFigureOut">
               <a:rPr lang="en-SI" smtClean="0"/>
-              <a:t>10/04/2025</a:t>
+              <a:t>23/04/2025</a:t>
             </a:fld>
             <a:endParaRPr lang="en-SI"/>
           </a:p>
@@ -1491,7 +1491,7 @@
           <a:p>
             <a:fld id="{3C671D42-39AB-412B-B1CC-613232E62CBC}" type="datetimeFigureOut">
               <a:rPr lang="en-SI" smtClean="0"/>
-              <a:t>10/04/2025</a:t>
+              <a:t>23/04/2025</a:t>
             </a:fld>
             <a:endParaRPr lang="en-SI"/>
           </a:p>
@@ -1832,7 +1832,7 @@
           <a:p>
             <a:fld id="{3C671D42-39AB-412B-B1CC-613232E62CBC}" type="datetimeFigureOut">
               <a:rPr lang="en-SI" smtClean="0"/>
-              <a:t>10/04/2025</a:t>
+              <a:t>23/04/2025</a:t>
             </a:fld>
             <a:endParaRPr lang="en-SI"/>
           </a:p>
@@ -2455,7 +2455,7 @@
           <a:p>
             <a:fld id="{3C671D42-39AB-412B-B1CC-613232E62CBC}" type="datetimeFigureOut">
               <a:rPr lang="en-SI" smtClean="0"/>
-              <a:t>10/04/2025</a:t>
+              <a:t>23/04/2025</a:t>
             </a:fld>
             <a:endParaRPr lang="en-SI"/>
           </a:p>
@@ -3315,7 +3315,7 @@
           <a:p>
             <a:fld id="{3C671D42-39AB-412B-B1CC-613232E62CBC}" type="datetimeFigureOut">
               <a:rPr lang="en-SI" smtClean="0"/>
-              <a:t>10/04/2025</a:t>
+              <a:t>23/04/2025</a:t>
             </a:fld>
             <a:endParaRPr lang="en-SI"/>
           </a:p>
@@ -3485,7 +3485,7 @@
           <a:p>
             <a:fld id="{3C671D42-39AB-412B-B1CC-613232E62CBC}" type="datetimeFigureOut">
               <a:rPr lang="en-SI" smtClean="0"/>
-              <a:t>10/04/2025</a:t>
+              <a:t>23/04/2025</a:t>
             </a:fld>
             <a:endParaRPr lang="en-SI"/>
           </a:p>
@@ -3665,7 +3665,7 @@
           <a:p>
             <a:fld id="{3C671D42-39AB-412B-B1CC-613232E62CBC}" type="datetimeFigureOut">
               <a:rPr lang="en-SI" smtClean="0"/>
-              <a:t>10/04/2025</a:t>
+              <a:t>23/04/2025</a:t>
             </a:fld>
             <a:endParaRPr lang="en-SI"/>
           </a:p>
@@ -3835,7 +3835,7 @@
           <a:p>
             <a:fld id="{3C671D42-39AB-412B-B1CC-613232E62CBC}" type="datetimeFigureOut">
               <a:rPr lang="en-SI" smtClean="0"/>
-              <a:t>10/04/2025</a:t>
+              <a:t>23/04/2025</a:t>
             </a:fld>
             <a:endParaRPr lang="en-SI"/>
           </a:p>
@@ -4082,7 +4082,7 @@
           <a:p>
             <a:fld id="{3C671D42-39AB-412B-B1CC-613232E62CBC}" type="datetimeFigureOut">
               <a:rPr lang="en-SI" smtClean="0"/>
-              <a:t>10/04/2025</a:t>
+              <a:t>23/04/2025</a:t>
             </a:fld>
             <a:endParaRPr lang="en-SI"/>
           </a:p>
@@ -4374,7 +4374,7 @@
           <a:p>
             <a:fld id="{3C671D42-39AB-412B-B1CC-613232E62CBC}" type="datetimeFigureOut">
               <a:rPr lang="en-SI" smtClean="0"/>
-              <a:t>10/04/2025</a:t>
+              <a:t>23/04/2025</a:t>
             </a:fld>
             <a:endParaRPr lang="en-SI"/>
           </a:p>
@@ -4818,7 +4818,7 @@
           <a:p>
             <a:fld id="{3C671D42-39AB-412B-B1CC-613232E62CBC}" type="datetimeFigureOut">
               <a:rPr lang="en-SI" smtClean="0"/>
-              <a:t>10/04/2025</a:t>
+              <a:t>23/04/2025</a:t>
             </a:fld>
             <a:endParaRPr lang="en-SI"/>
           </a:p>
@@ -4936,7 +4936,7 @@
           <a:p>
             <a:fld id="{3C671D42-39AB-412B-B1CC-613232E62CBC}" type="datetimeFigureOut">
               <a:rPr lang="en-SI" smtClean="0"/>
-              <a:t>10/04/2025</a:t>
+              <a:t>23/04/2025</a:t>
             </a:fld>
             <a:endParaRPr lang="en-SI"/>
           </a:p>
@@ -5031,7 +5031,7 @@
           <a:p>
             <a:fld id="{3C671D42-39AB-412B-B1CC-613232E62CBC}" type="datetimeFigureOut">
               <a:rPr lang="en-SI" smtClean="0"/>
-              <a:t>10/04/2025</a:t>
+              <a:t>23/04/2025</a:t>
             </a:fld>
             <a:endParaRPr lang="en-SI"/>
           </a:p>
@@ -5310,7 +5310,7 @@
           <a:p>
             <a:fld id="{3C671D42-39AB-412B-B1CC-613232E62CBC}" type="datetimeFigureOut">
               <a:rPr lang="en-SI" smtClean="0"/>
-              <a:t>10/04/2025</a:t>
+              <a:t>23/04/2025</a:t>
             </a:fld>
             <a:endParaRPr lang="en-SI"/>
           </a:p>
@@ -5585,7 +5585,7 @@
           <a:p>
             <a:fld id="{3C671D42-39AB-412B-B1CC-613232E62CBC}" type="datetimeFigureOut">
               <a:rPr lang="en-SI" smtClean="0"/>
-              <a:t>10/04/2025</a:t>
+              <a:t>23/04/2025</a:t>
             </a:fld>
             <a:endParaRPr lang="en-SI"/>
           </a:p>
@@ -6014,7 +6014,7 @@
           <a:p>
             <a:fld id="{3C671D42-39AB-412B-B1CC-613232E62CBC}" type="datetimeFigureOut">
               <a:rPr lang="en-SI" smtClean="0"/>
-              <a:t>10/04/2025</a:t>
+              <a:t>23/04/2025</a:t>
             </a:fld>
             <a:endParaRPr lang="en-SI"/>
           </a:p>
@@ -7482,9 +7482,16 @@
             <p:ph idx="1"/>
           </p:nvPr>
         </p:nvSpPr>
-        <p:spPr/>
-        <p:txBody>
-          <a:bodyPr/>
+        <p:spPr>
+          <a:xfrm flipH="1">
+            <a:off x="833719" y="116541"/>
+            <a:ext cx="269594" cy="249864"/>
+          </a:xfrm>
+        </p:spPr>
+        <p:txBody>
+          <a:bodyPr>
+            <a:normAutofit fontScale="55000" lnSpcReduction="20000"/>
+          </a:bodyPr>
           <a:lstStyle/>
           <a:p>
             <a:endParaRPr lang="en-SI" dirty="0"/>
@@ -7732,48 +7739,37 @@
           </a:p>
         </p:txBody>
       </p:sp>
-      <p:pic>
-        <p:nvPicPr>
-          <p:cNvPr id="6" name="20250410-1412-49.0163523">
-            <a:hlinkClick r:id="" action="ppaction://media"/>
+      <p:sp>
+        <p:nvSpPr>
+          <p:cNvPr id="4" name="Content Placeholder 3">
             <a:extLst>
               <a:ext uri="{FF2B5EF4-FFF2-40B4-BE49-F238E27FC236}">
-                <a16:creationId xmlns:a16="http://schemas.microsoft.com/office/drawing/2014/main" id="{60C22EA6-FD02-9250-5EBE-710704B5FDCB}"/>
+                <a16:creationId xmlns:a16="http://schemas.microsoft.com/office/drawing/2014/main" id="{EB63CDFB-65CE-6F3A-272E-4F4B0404D1D0}"/>
               </a:ext>
             </a:extLst>
           </p:cNvPr>
-          <p:cNvPicPr>
-            <a:picLocks noGrp="1" noChangeAspect="1"/>
-          </p:cNvPicPr>
+          <p:cNvSpPr>
+            <a:spLocks noGrp="1"/>
+          </p:cNvSpPr>
           <p:nvPr>
             <p:ph idx="1"/>
-            <a:videoFile r:link="rId2"/>
-            <p:extLst>
-              <p:ext uri="{DAA4B4D4-6D71-4841-9C94-3DE7FCFB9230}">
-                <p14:media xmlns:p14="http://schemas.microsoft.com/office/powerpoint/2010/main" r:embed="rId1"/>
-              </p:ext>
-            </p:extLst>
-          </p:nvPr>
-        </p:nvPicPr>
-        <p:blipFill>
-          <a:blip r:embed="rId4"/>
-          <a:stretch>
-            <a:fillRect/>
-          </a:stretch>
-        </p:blipFill>
-        <p:spPr>
-          <a:xfrm>
-            <a:off x="2824168" y="1251884"/>
-            <a:ext cx="8947150" cy="1600200"/>
-          </a:xfrm>
-        </p:spPr>
-      </p:pic>
+          </p:nvPr>
+        </p:nvSpPr>
+        <p:spPr/>
+        <p:txBody>
+          <a:bodyPr/>
+          <a:lstStyle/>
+          <a:p>
+            <a:endParaRPr lang="en-SI"/>
+          </a:p>
+        </p:txBody>
+      </p:sp>
       <p:pic>
         <p:nvPicPr>
-          <p:cNvPr id="5" name="Picture 4">
+          <p:cNvPr id="8" name="Picture 7">
             <a:extLst>
               <a:ext uri="{FF2B5EF4-FFF2-40B4-BE49-F238E27FC236}">
-                <a16:creationId xmlns:a16="http://schemas.microsoft.com/office/drawing/2014/main" id="{14C015A3-9A5F-E221-8111-7BFD081D82F8}"/>
+                <a16:creationId xmlns:a16="http://schemas.microsoft.com/office/drawing/2014/main" id="{89120BFF-8BF1-0EA0-FDF3-CB62FB608D5D}"/>
               </a:ext>
             </a:extLst>
           </p:cNvPr>
@@ -7783,15 +7779,15 @@
           <p:nvPr/>
         </p:nvPicPr>
         <p:blipFill>
-          <a:blip r:embed="rId5"/>
+          <a:blip r:embed="rId2"/>
           <a:stretch>
             <a:fillRect/>
           </a:stretch>
         </p:blipFill>
         <p:spPr>
           <a:xfrm>
-            <a:off x="2321199" y="3513960"/>
-            <a:ext cx="9450119" cy="2934109"/>
+            <a:off x="2994211" y="322729"/>
+            <a:ext cx="8589833" cy="6171864"/>
           </a:xfrm>
           <a:prstGeom prst="rect">
             <a:avLst/>
@@ -7808,141 +7804,6 @@
   <p:clrMapOvr>
     <a:masterClrMapping/>
   </p:clrMapOvr>
-  <p:timing>
-    <p:tnLst>
-      <p:par>
-        <p:cTn id="1" dur="indefinite" restart="never" nodeType="tmRoot">
-          <p:childTnLst>
-            <p:seq concurrent="1" nextAc="seek">
-              <p:cTn id="2" dur="indefinite" nodeType="mainSeq">
-                <p:childTnLst>
-                  <p:par>
-                    <p:cTn id="3" fill="hold">
-                      <p:stCondLst>
-                        <p:cond delay="indefinite"/>
-                      </p:stCondLst>
-                      <p:childTnLst>
-                        <p:par>
-                          <p:cTn id="4" fill="hold">
-                            <p:stCondLst>
-                              <p:cond delay="0"/>
-                            </p:stCondLst>
-                            <p:childTnLst>
-                              <p:par>
-                                <p:cTn id="5" presetID="1" presetClass="mediacall" presetSubtype="0" fill="hold" nodeType="clickEffect">
-                                  <p:stCondLst>
-                                    <p:cond delay="0"/>
-                                  </p:stCondLst>
-                                  <p:childTnLst>
-                                    <p:cmd type="call" cmd="playFrom(0.0)">
-                                      <p:cBhvr>
-                                        <p:cTn id="6" dur="14766" fill="hold"/>
-                                        <p:tgtEl>
-                                          <p:spTgt spid="6"/>
-                                        </p:tgtEl>
-                                      </p:cBhvr>
-                                    </p:cmd>
-                                  </p:childTnLst>
-                                </p:cTn>
-                              </p:par>
-                            </p:childTnLst>
-                          </p:cTn>
-                        </p:par>
-                      </p:childTnLst>
-                    </p:cTn>
-                  </p:par>
-                </p:childTnLst>
-              </p:cTn>
-              <p:prevCondLst>
-                <p:cond evt="onPrev" delay="0">
-                  <p:tgtEl>
-                    <p:sldTgt/>
-                  </p:tgtEl>
-                </p:cond>
-              </p:prevCondLst>
-              <p:nextCondLst>
-                <p:cond evt="onNext" delay="0">
-                  <p:tgtEl>
-                    <p:sldTgt/>
-                  </p:tgtEl>
-                </p:cond>
-              </p:nextCondLst>
-            </p:seq>
-            <p:video>
-              <p:cMediaNode vol="80000">
-                <p:cTn id="7" fill="hold" display="0">
-                  <p:stCondLst>
-                    <p:cond delay="indefinite"/>
-                  </p:stCondLst>
-                </p:cTn>
-                <p:tgtEl>
-                  <p:spTgt spid="6"/>
-                </p:tgtEl>
-              </p:cMediaNode>
-            </p:video>
-            <p:seq concurrent="1" nextAc="seek">
-              <p:cTn id="8" restart="whenNotActive" fill="hold" evtFilter="cancelBubble" nodeType="interactiveSeq">
-                <p:stCondLst>
-                  <p:cond evt="onClick" delay="0">
-                    <p:tgtEl>
-                      <p:spTgt spid="6"/>
-                    </p:tgtEl>
-                  </p:cond>
-                </p:stCondLst>
-                <p:endSync evt="end" delay="0">
-                  <p:rtn val="all"/>
-                </p:endSync>
-                <p:childTnLst>
-                  <p:par>
-                    <p:cTn id="9" fill="hold">
-                      <p:stCondLst>
-                        <p:cond delay="0"/>
-                      </p:stCondLst>
-                      <p:childTnLst>
-                        <p:par>
-                          <p:cTn id="10" fill="hold">
-                            <p:stCondLst>
-                              <p:cond delay="0"/>
-                            </p:stCondLst>
-                            <p:childTnLst>
-                              <p:par>
-                                <p:cTn id="11" presetID="2" presetClass="mediacall" presetSubtype="0" fill="hold" nodeType="clickEffect">
-                                  <p:stCondLst>
-                                    <p:cond delay="0"/>
-                                  </p:stCondLst>
-                                  <p:childTnLst>
-                                    <p:cmd type="call" cmd="togglePause">
-                                      <p:cBhvr>
-                                        <p:cTn id="12" dur="1" fill="hold"/>
-                                        <p:tgtEl>
-                                          <p:spTgt spid="6"/>
-                                        </p:tgtEl>
-                                      </p:cBhvr>
-                                    </p:cmd>
-                                  </p:childTnLst>
-                                </p:cTn>
-                              </p:par>
-                            </p:childTnLst>
-                          </p:cTn>
-                        </p:par>
-                      </p:childTnLst>
-                    </p:cTn>
-                  </p:par>
-                </p:childTnLst>
-              </p:cTn>
-              <p:nextCondLst>
-                <p:cond evt="onClick" delay="0">
-                  <p:tgtEl>
-                    <p:spTgt spid="6"/>
-                  </p:tgtEl>
-                </p:cond>
-              </p:nextCondLst>
-            </p:seq>
-          </p:childTnLst>
-        </p:cTn>
-      </p:par>
-    </p:tnLst>
-  </p:timing>
 </p:sld>
 </file>
 

</xml_diff>